<commit_message>
adding some slides, removing value vs ref types
</commit_message>
<xml_diff>
--- a/CLR_via_CSharp/Week3/CLR_Via_CSharp_chapter5.pptx
+++ b/CLR_via_CSharp/Week3/CLR_Via_CSharp_chapter5.pptx
@@ -9,8 +9,14 @@
     <p:sldId id="257" r:id="rId3"/>
     <p:sldId id="260" r:id="rId4"/>
     <p:sldId id="258" r:id="rId5"/>
-    <p:sldId id="259" r:id="rId6"/>
-    <p:sldId id="261" r:id="rId7"/>
+    <p:sldId id="261" r:id="rId6"/>
+    <p:sldId id="262" r:id="rId7"/>
+    <p:sldId id="263" r:id="rId8"/>
+    <p:sldId id="264" r:id="rId9"/>
+    <p:sldId id="265" r:id="rId10"/>
+    <p:sldId id="266" r:id="rId11"/>
+    <p:sldId id="267" r:id="rId12"/>
+    <p:sldId id="268" r:id="rId13"/>
   </p:sldIdLst>
   <p:sldSz cx="12192000" cy="6858000"/>
   <p:notesSz cx="6858000" cy="9144000"/>
@@ -109,6 +115,11 @@
       </a:defRPr>
     </a:lvl9pPr>
   </p:defaultTextStyle>
+  <p:extLst>
+    <p:ext uri="{EFAFB233-063F-42B5-8137-9DF3F51BA10A}">
+      <p15:sldGuideLst xmlns:p15="http://schemas.microsoft.com/office/powerpoint/2012/main"/>
+    </p:ext>
+  </p:extLst>
 </p:presentation>
 </file>
 
@@ -243,7 +254,7 @@
           <a:p>
             <a:fld id="{A76B8C76-11FA-4B60-87BA-E72DD5BCA081}" type="datetimeFigureOut">
               <a:rPr lang="en-US" smtClean="0"/>
-              <a:t>7/24/2022</a:t>
+              <a:t>7/27/2022</a:t>
             </a:fld>
             <a:endParaRPr lang="en-US"/>
           </a:p>
@@ -413,7 +424,7 @@
           <a:p>
             <a:fld id="{A76B8C76-11FA-4B60-87BA-E72DD5BCA081}" type="datetimeFigureOut">
               <a:rPr lang="en-US" smtClean="0"/>
-              <a:t>7/24/2022</a:t>
+              <a:t>7/27/2022</a:t>
             </a:fld>
             <a:endParaRPr lang="en-US"/>
           </a:p>
@@ -593,7 +604,7 @@
           <a:p>
             <a:fld id="{A76B8C76-11FA-4B60-87BA-E72DD5BCA081}" type="datetimeFigureOut">
               <a:rPr lang="en-US" smtClean="0"/>
-              <a:t>7/24/2022</a:t>
+              <a:t>7/27/2022</a:t>
             </a:fld>
             <a:endParaRPr lang="en-US"/>
           </a:p>
@@ -763,7 +774,7 @@
           <a:p>
             <a:fld id="{A76B8C76-11FA-4B60-87BA-E72DD5BCA081}" type="datetimeFigureOut">
               <a:rPr lang="en-US" smtClean="0"/>
-              <a:t>7/24/2022</a:t>
+              <a:t>7/27/2022</a:t>
             </a:fld>
             <a:endParaRPr lang="en-US"/>
           </a:p>
@@ -1009,7 +1020,7 @@
           <a:p>
             <a:fld id="{A76B8C76-11FA-4B60-87BA-E72DD5BCA081}" type="datetimeFigureOut">
               <a:rPr lang="en-US" smtClean="0"/>
-              <a:t>7/24/2022</a:t>
+              <a:t>7/27/2022</a:t>
             </a:fld>
             <a:endParaRPr lang="en-US"/>
           </a:p>
@@ -1241,7 +1252,7 @@
           <a:p>
             <a:fld id="{A76B8C76-11FA-4B60-87BA-E72DD5BCA081}" type="datetimeFigureOut">
               <a:rPr lang="en-US" smtClean="0"/>
-              <a:t>7/24/2022</a:t>
+              <a:t>7/27/2022</a:t>
             </a:fld>
             <a:endParaRPr lang="en-US"/>
           </a:p>
@@ -1608,7 +1619,7 @@
           <a:p>
             <a:fld id="{A76B8C76-11FA-4B60-87BA-E72DD5BCA081}" type="datetimeFigureOut">
               <a:rPr lang="en-US" smtClean="0"/>
-              <a:t>7/24/2022</a:t>
+              <a:t>7/27/2022</a:t>
             </a:fld>
             <a:endParaRPr lang="en-US"/>
           </a:p>
@@ -1726,7 +1737,7 @@
           <a:p>
             <a:fld id="{A76B8C76-11FA-4B60-87BA-E72DD5BCA081}" type="datetimeFigureOut">
               <a:rPr lang="en-US" smtClean="0"/>
-              <a:t>7/24/2022</a:t>
+              <a:t>7/27/2022</a:t>
             </a:fld>
             <a:endParaRPr lang="en-US"/>
           </a:p>
@@ -1821,7 +1832,7 @@
           <a:p>
             <a:fld id="{A76B8C76-11FA-4B60-87BA-E72DD5BCA081}" type="datetimeFigureOut">
               <a:rPr lang="en-US" smtClean="0"/>
-              <a:t>7/24/2022</a:t>
+              <a:t>7/27/2022</a:t>
             </a:fld>
             <a:endParaRPr lang="en-US"/>
           </a:p>
@@ -2098,7 +2109,7 @@
           <a:p>
             <a:fld id="{A76B8C76-11FA-4B60-87BA-E72DD5BCA081}" type="datetimeFigureOut">
               <a:rPr lang="en-US" smtClean="0"/>
-              <a:t>7/24/2022</a:t>
+              <a:t>7/27/2022</a:t>
             </a:fld>
             <a:endParaRPr lang="en-US"/>
           </a:p>
@@ -2355,7 +2366,7 @@
           <a:p>
             <a:fld id="{A76B8C76-11FA-4B60-87BA-E72DD5BCA081}" type="datetimeFigureOut">
               <a:rPr lang="en-US" smtClean="0"/>
-              <a:t>7/24/2022</a:t>
+              <a:t>7/27/2022</a:t>
             </a:fld>
             <a:endParaRPr lang="en-US"/>
           </a:p>
@@ -2568,7 +2579,7 @@
           <a:p>
             <a:fld id="{A76B8C76-11FA-4B60-87BA-E72DD5BCA081}" type="datetimeFigureOut">
               <a:rPr lang="en-US" smtClean="0"/>
-              <a:t>7/24/2022</a:t>
+              <a:t>7/27/2022</a:t>
             </a:fld>
             <a:endParaRPr lang="en-US"/>
           </a:p>
@@ -3042,6 +3053,365 @@
 </p:sld>
 </file>
 
+<file path=ppt/slides/slide10.xml><?xml version="1.0" encoding="utf-8"?>
+<p:sld xmlns:a="http://schemas.openxmlformats.org/drawingml/2006/main" xmlns:r="http://schemas.openxmlformats.org/officeDocument/2006/relationships" xmlns:p="http://schemas.openxmlformats.org/presentationml/2006/main">
+  <p:cSld>
+    <p:spTree>
+      <p:nvGrpSpPr>
+        <p:cNvPr id="1" name=""/>
+        <p:cNvGrpSpPr/>
+        <p:nvPr/>
+      </p:nvGrpSpPr>
+      <p:grpSpPr>
+        <a:xfrm>
+          <a:off x="0" y="0"/>
+          <a:ext cx="0" cy="0"/>
+          <a:chOff x="0" y="0"/>
+          <a:chExt cx="0" cy="0"/>
+        </a:xfrm>
+      </p:grpSpPr>
+      <p:sp>
+        <p:nvSpPr>
+          <p:cNvPr id="10" name="Title 9">
+            <a:extLst>
+              <a:ext uri="{FF2B5EF4-FFF2-40B4-BE49-F238E27FC236}">
+                <a16:creationId xmlns:a16="http://schemas.microsoft.com/office/drawing/2014/main" id="{548346C7-9F7B-7FEA-E9AD-269D66D247D5}"/>
+              </a:ext>
+            </a:extLst>
+          </p:cNvPr>
+          <p:cNvSpPr>
+            <a:spLocks noGrp="1"/>
+          </p:cNvSpPr>
+          <p:nvPr>
+            <p:ph type="title"/>
+          </p:nvPr>
+        </p:nvSpPr>
+        <p:spPr/>
+        <p:txBody>
+          <a:bodyPr/>
+          <a:lstStyle/>
+          <a:p>
+            <a:r>
+              <a:rPr lang="en-US" dirty="0"/>
+              <a:t>R1.x=8; v1.x = 9</a:t>
+            </a:r>
+          </a:p>
+        </p:txBody>
+      </p:sp>
+      <p:pic>
+        <p:nvPicPr>
+          <p:cNvPr id="8" name="Content Placeholder 7">
+            <a:extLst>
+              <a:ext uri="{FF2B5EF4-FFF2-40B4-BE49-F238E27FC236}">
+                <a16:creationId xmlns:a16="http://schemas.microsoft.com/office/drawing/2014/main" id="{1EB8D043-7DD1-80BF-5A8E-D9BCE9926047}"/>
+              </a:ext>
+            </a:extLst>
+          </p:cNvPr>
+          <p:cNvPicPr>
+            <a:picLocks noGrp="1" noChangeAspect="1"/>
+          </p:cNvPicPr>
+          <p:nvPr>
+            <p:ph idx="1"/>
+          </p:nvPr>
+        </p:nvPicPr>
+        <p:blipFill>
+          <a:blip r:embed="rId2"/>
+          <a:stretch>
+            <a:fillRect/>
+          </a:stretch>
+        </p:blipFill>
+        <p:spPr>
+          <a:xfrm>
+            <a:off x="3048000" y="2620169"/>
+            <a:ext cx="6096000" cy="2762250"/>
+          </a:xfrm>
+        </p:spPr>
+      </p:pic>
+    </p:spTree>
+    <p:extLst>
+      <p:ext uri="{BB962C8B-B14F-4D97-AF65-F5344CB8AC3E}">
+        <p14:creationId xmlns:p14="http://schemas.microsoft.com/office/powerpoint/2010/main" val="3857762873"/>
+      </p:ext>
+    </p:extLst>
+  </p:cSld>
+  <p:clrMapOvr>
+    <a:masterClrMapping/>
+  </p:clrMapOvr>
+</p:sld>
+</file>
+
+<file path=ppt/slides/slide11.xml><?xml version="1.0" encoding="utf-8"?>
+<p:sld xmlns:a="http://schemas.openxmlformats.org/drawingml/2006/main" xmlns:r="http://schemas.openxmlformats.org/officeDocument/2006/relationships" xmlns:p="http://schemas.openxmlformats.org/presentationml/2006/main">
+  <p:cSld>
+    <p:spTree>
+      <p:nvGrpSpPr>
+        <p:cNvPr id="1" name=""/>
+        <p:cNvGrpSpPr/>
+        <p:nvPr/>
+      </p:nvGrpSpPr>
+      <p:grpSpPr>
+        <a:xfrm>
+          <a:off x="0" y="0"/>
+          <a:ext cx="0" cy="0"/>
+          <a:chOff x="0" y="0"/>
+          <a:chExt cx="0" cy="0"/>
+        </a:xfrm>
+      </p:grpSpPr>
+      <p:sp>
+        <p:nvSpPr>
+          <p:cNvPr id="10" name="Title 9">
+            <a:extLst>
+              <a:ext uri="{FF2B5EF4-FFF2-40B4-BE49-F238E27FC236}">
+                <a16:creationId xmlns:a16="http://schemas.microsoft.com/office/drawing/2014/main" id="{548346C7-9F7B-7FEA-E9AD-269D66D247D5}"/>
+              </a:ext>
+            </a:extLst>
+          </p:cNvPr>
+          <p:cNvSpPr>
+            <a:spLocks noGrp="1"/>
+          </p:cNvSpPr>
+          <p:nvPr>
+            <p:ph type="title"/>
+          </p:nvPr>
+        </p:nvSpPr>
+        <p:spPr/>
+        <p:txBody>
+          <a:bodyPr/>
+          <a:lstStyle/>
+          <a:p>
+            <a:r>
+              <a:rPr lang="en-US" dirty="0"/>
+              <a:t>Values of v1.x, v2.x, r1.x, r2.x</a:t>
+            </a:r>
+          </a:p>
+        </p:txBody>
+      </p:sp>
+      <p:pic>
+        <p:nvPicPr>
+          <p:cNvPr id="7" name="Content Placeholder 6">
+            <a:extLst>
+              <a:ext uri="{FF2B5EF4-FFF2-40B4-BE49-F238E27FC236}">
+                <a16:creationId xmlns:a16="http://schemas.microsoft.com/office/drawing/2014/main" id="{41E647B9-0BB9-FDE8-5F27-7CC97228851A}"/>
+              </a:ext>
+            </a:extLst>
+          </p:cNvPr>
+          <p:cNvPicPr>
+            <a:picLocks noGrp="1" noChangeAspect="1"/>
+          </p:cNvPicPr>
+          <p:nvPr>
+            <p:ph idx="1"/>
+          </p:nvPr>
+        </p:nvPicPr>
+        <p:blipFill>
+          <a:blip r:embed="rId2"/>
+          <a:stretch>
+            <a:fillRect/>
+          </a:stretch>
+        </p:blipFill>
+        <p:spPr>
+          <a:xfrm>
+            <a:off x="3048000" y="2620169"/>
+            <a:ext cx="6096000" cy="2762250"/>
+          </a:xfrm>
+        </p:spPr>
+      </p:pic>
+    </p:spTree>
+    <p:extLst>
+      <p:ext uri="{BB962C8B-B14F-4D97-AF65-F5344CB8AC3E}">
+        <p14:creationId xmlns:p14="http://schemas.microsoft.com/office/powerpoint/2010/main" val="91116639"/>
+      </p:ext>
+    </p:extLst>
+  </p:cSld>
+  <p:clrMapOvr>
+    <a:masterClrMapping/>
+  </p:clrMapOvr>
+</p:sld>
+</file>
+
+<file path=ppt/slides/slide12.xml><?xml version="1.0" encoding="utf-8"?>
+<p:sld xmlns:a="http://schemas.openxmlformats.org/drawingml/2006/main" xmlns:r="http://schemas.openxmlformats.org/officeDocument/2006/relationships" xmlns:p="http://schemas.openxmlformats.org/presentationml/2006/main">
+  <p:cSld>
+    <p:spTree>
+      <p:nvGrpSpPr>
+        <p:cNvPr id="1" name=""/>
+        <p:cNvGrpSpPr/>
+        <p:nvPr/>
+      </p:nvGrpSpPr>
+      <p:grpSpPr>
+        <a:xfrm>
+          <a:off x="0" y="0"/>
+          <a:ext cx="0" cy="0"/>
+          <a:chOff x="0" y="0"/>
+          <a:chExt cx="0" cy="0"/>
+        </a:xfrm>
+      </p:grpSpPr>
+      <p:sp>
+        <p:nvSpPr>
+          <p:cNvPr id="2" name="Title 1">
+            <a:extLst>
+              <a:ext uri="{FF2B5EF4-FFF2-40B4-BE49-F238E27FC236}">
+                <a16:creationId xmlns:a16="http://schemas.microsoft.com/office/drawing/2014/main" id="{BEBAD842-2AEE-339F-B98D-F17753ACCB67}"/>
+              </a:ext>
+            </a:extLst>
+          </p:cNvPr>
+          <p:cNvSpPr>
+            <a:spLocks noGrp="1"/>
+          </p:cNvSpPr>
+          <p:nvPr>
+            <p:ph type="title"/>
+          </p:nvPr>
+        </p:nvSpPr>
+        <p:spPr/>
+        <p:txBody>
+          <a:bodyPr/>
+          <a:lstStyle/>
+          <a:p>
+            <a:r>
+              <a:rPr lang="en-US" dirty="0"/>
+              <a:t>Considerations</a:t>
+            </a:r>
+          </a:p>
+        </p:txBody>
+      </p:sp>
+      <p:sp>
+        <p:nvSpPr>
+          <p:cNvPr id="3" name="Content Placeholder 2">
+            <a:extLst>
+              <a:ext uri="{FF2B5EF4-FFF2-40B4-BE49-F238E27FC236}">
+                <a16:creationId xmlns:a16="http://schemas.microsoft.com/office/drawing/2014/main" id="{6A9877B4-06D2-648C-AC10-64388CADDA47}"/>
+              </a:ext>
+            </a:extLst>
+          </p:cNvPr>
+          <p:cNvSpPr>
+            <a:spLocks noGrp="1"/>
+          </p:cNvSpPr>
+          <p:nvPr>
+            <p:ph idx="1"/>
+          </p:nvPr>
+        </p:nvSpPr>
+        <p:spPr/>
+        <p:txBody>
+          <a:bodyPr>
+            <a:normAutofit lnSpcReduction="10000"/>
+          </a:bodyPr>
+          <a:lstStyle/>
+          <a:p>
+            <a:pPr marL="0" indent="0">
+              <a:buNone/>
+            </a:pPr>
+            <a:r>
+              <a:rPr lang="en-US" dirty="0"/>
+              <a:t>When would you use one over the other?</a:t>
+            </a:r>
+          </a:p>
+          <a:p>
+            <a:pPr marL="0" indent="0">
+              <a:buNone/>
+            </a:pPr>
+            <a:endParaRPr lang="en-US" dirty="0"/>
+          </a:p>
+          <a:p>
+            <a:pPr marL="0" indent="0">
+              <a:buNone/>
+            </a:pPr>
+            <a:r>
+              <a:rPr lang="en-US" dirty="0"/>
+              <a:t>Some ideas </a:t>
+            </a:r>
+            <a:endParaRPr lang="en-US" dirty="0">
+              <a:sym typeface="Wingdings" panose="05000000000000000000" pitchFamily="2" charset="2"/>
+            </a:endParaRPr>
+          </a:p>
+          <a:p>
+            <a:pPr marL="0" indent="0">
+              <a:buNone/>
+            </a:pPr>
+            <a:r>
+              <a:rPr lang="en-US" dirty="0">
+                <a:sym typeface="Wingdings" panose="05000000000000000000" pitchFamily="2" charset="2"/>
+              </a:rPr>
+              <a:t>want memory to be managed</a:t>
+            </a:r>
+          </a:p>
+          <a:p>
+            <a:pPr>
+              <a:buFont typeface="Wingdings" panose="05000000000000000000" pitchFamily="2" charset="2"/>
+              <a:buChar char="à"/>
+            </a:pPr>
+            <a:r>
+              <a:rPr lang="en-US" dirty="0">
+                <a:sym typeface="Wingdings" panose="05000000000000000000" pitchFamily="2" charset="2"/>
+              </a:rPr>
+              <a:t>Types won’t be modified, act as constants?</a:t>
+            </a:r>
+          </a:p>
+          <a:p>
+            <a:pPr>
+              <a:buFont typeface="Wingdings" panose="05000000000000000000" pitchFamily="2" charset="2"/>
+              <a:buChar char="à"/>
+            </a:pPr>
+            <a:r>
+              <a:rPr lang="en-US" dirty="0">
+                <a:sym typeface="Wingdings" panose="05000000000000000000" pitchFamily="2" charset="2"/>
+              </a:rPr>
+              <a:t>No inheritance</a:t>
+            </a:r>
+          </a:p>
+          <a:p>
+            <a:pPr>
+              <a:buFont typeface="Wingdings" panose="05000000000000000000" pitchFamily="2" charset="2"/>
+              <a:buChar char="à"/>
+            </a:pPr>
+            <a:r>
+              <a:rPr lang="en-US" dirty="0">
+                <a:sym typeface="Wingdings" panose="05000000000000000000" pitchFamily="2" charset="2"/>
+              </a:rPr>
+              <a:t>Small size?</a:t>
+            </a:r>
+          </a:p>
+          <a:p>
+            <a:pPr>
+              <a:buFont typeface="Wingdings" panose="05000000000000000000" pitchFamily="2" charset="2"/>
+              <a:buChar char="à"/>
+            </a:pPr>
+            <a:endParaRPr lang="en-US" dirty="0">
+              <a:sym typeface="Wingdings" panose="05000000000000000000" pitchFamily="2" charset="2"/>
+            </a:endParaRPr>
+          </a:p>
+          <a:p>
+            <a:pPr marL="0" indent="0">
+              <a:buNone/>
+            </a:pPr>
+            <a:r>
+              <a:rPr lang="en-US" dirty="0">
+                <a:sym typeface="Wingdings" panose="05000000000000000000" pitchFamily="2" charset="2"/>
+              </a:rPr>
+              <a:t>Some trivia, value types are derived from </a:t>
+            </a:r>
+            <a:r>
+              <a:rPr lang="en-US" dirty="0" err="1">
+                <a:sym typeface="Wingdings" panose="05000000000000000000" pitchFamily="2" charset="2"/>
+              </a:rPr>
+              <a:t>System.ValueType</a:t>
+            </a:r>
+            <a:endParaRPr lang="en-US" dirty="0">
+              <a:sym typeface="Wingdings" panose="05000000000000000000" pitchFamily="2" charset="2"/>
+            </a:endParaRPr>
+          </a:p>
+        </p:txBody>
+      </p:sp>
+    </p:spTree>
+    <p:extLst>
+      <p:ext uri="{BB962C8B-B14F-4D97-AF65-F5344CB8AC3E}">
+        <p14:creationId xmlns:p14="http://schemas.microsoft.com/office/powerpoint/2010/main" val="1747301066"/>
+      </p:ext>
+    </p:extLst>
+  </p:cSld>
+  <p:clrMapOvr>
+    <a:masterClrMapping/>
+  </p:clrMapOvr>
+</p:sld>
+</file>
+
 <file path=ppt/slides/slide2.xml><?xml version="1.0" encoding="utf-8"?>
 <p:sld xmlns:a="http://schemas.openxmlformats.org/drawingml/2006/main" xmlns:r="http://schemas.openxmlformats.org/officeDocument/2006/relationships" xmlns:p="http://schemas.openxmlformats.org/presentationml/2006/main">
   <p:cSld>
@@ -3185,12 +3555,8 @@
           <a:lstStyle/>
           <a:p>
             <a:r>
-              <a:rPr lang="en-US" dirty="0" err="1"/>
-              <a:t>Srikar’s</a:t>
-            </a:r>
-            <a:r>
               <a:rPr lang="en-US" dirty="0"/>
-              <a:t> Patented Smelly Onion method</a:t>
+              <a:t>Smelly Onion method</a:t>
             </a:r>
           </a:p>
         </p:txBody>
@@ -3218,8 +3584,13 @@
           <a:p>
             <a:r>
               <a:rPr lang="en-US" dirty="0"/>
-              <a:t>We skipped parts of 1-3. </a:t>
-            </a:r>
+              <a:t>We skipped parts of 1-3</a:t>
+            </a:r>
+            <a:r>
+              <a:rPr lang="en-US"/>
+              <a:t>. </a:t>
+            </a:r>
+            <a:endParaRPr lang="en-US" dirty="0"/>
           </a:p>
           <a:p>
             <a:r>
@@ -3238,6 +3609,13 @@
             <a:r>
               <a:rPr lang="en-US" dirty="0"/>
               <a:t>Basically I’ll be trying to slowly add in concepts from 1-3 as they make sense</a:t>
+            </a:r>
+          </a:p>
+          <a:p>
+            <a:pPr lvl="2"/>
+            <a:r>
+              <a:rPr lang="en-US" dirty="0"/>
+              <a:t>Usually around smaller chapters</a:t>
             </a:r>
           </a:p>
         </p:txBody>
@@ -3323,12 +3701,6 @@
           <a:p>
             <a:r>
               <a:rPr lang="en-US" dirty="0"/>
-              <a:t>FCL (framework class library)</a:t>
-            </a:r>
-          </a:p>
-          <a:p>
-            <a:r>
-              <a:rPr lang="en-US" dirty="0"/>
               <a:t>Primitive Types</a:t>
             </a:r>
           </a:p>
@@ -3390,7 +3762,7 @@
           <p:cNvPr id="2" name="Title 1">
             <a:extLst>
               <a:ext uri="{FF2B5EF4-FFF2-40B4-BE49-F238E27FC236}">
-                <a16:creationId xmlns:a16="http://schemas.microsoft.com/office/drawing/2014/main" id="{B3C39AAD-B228-5DA6-0645-0FA7B9EE4A77}"/>
+                <a16:creationId xmlns:a16="http://schemas.microsoft.com/office/drawing/2014/main" id="{1C0FF832-1001-856D-7690-A4FFF526E371}"/>
               </a:ext>
             </a:extLst>
           </p:cNvPr>
@@ -3408,7 +3780,7 @@
           <a:p>
             <a:r>
               <a:rPr lang="en-US" dirty="0"/>
-              <a:t>Frame Work Class Library</a:t>
+              <a:t>What is a primitive Type</a:t>
             </a:r>
           </a:p>
         </p:txBody>
@@ -3418,7 +3790,7 @@
           <p:cNvPr id="3" name="Content Placeholder 2">
             <a:extLst>
               <a:ext uri="{FF2B5EF4-FFF2-40B4-BE49-F238E27FC236}">
-                <a16:creationId xmlns:a16="http://schemas.microsoft.com/office/drawing/2014/main" id="{962BA460-D821-5AD6-6370-F1DACA3AF889}"/>
+                <a16:creationId xmlns:a16="http://schemas.microsoft.com/office/drawing/2014/main" id="{31B9EEF5-AE8E-F21F-1CD2-25C104F0E295}"/>
               </a:ext>
             </a:extLst>
           </p:cNvPr>
@@ -3436,59 +3808,32 @@
           <a:p>
             <a:r>
               <a:rPr lang="en-US" dirty="0"/>
-              <a:t>Where do basic classes come from.</a:t>
+              <a:t>A basic type that comes w/ the language/CLR; types that other classes are built on</a:t>
             </a:r>
           </a:p>
           <a:p>
             <a:r>
               <a:rPr lang="en-US" dirty="0"/>
-              <a:t>Exercise – create a new solution  in VS</a:t>
-            </a:r>
-          </a:p>
-          <a:p>
-            <a:pPr lvl="1"/>
-            <a:r>
-              <a:rPr lang="en-US" dirty="0"/>
-              <a:t>You have a ton of options– desk top, console, web, Xamarin etc. </a:t>
-            </a:r>
-          </a:p>
-          <a:p>
-            <a:r>
-              <a:rPr lang="en-US" dirty="0"/>
-              <a:t>Framework class libraries are the tools you have to work with</a:t>
-            </a:r>
-          </a:p>
-          <a:p>
-            <a:pPr lvl="1"/>
-            <a:r>
-              <a:rPr lang="en-US" dirty="0"/>
-              <a:t>Desktop app might have cursor functionality built in </a:t>
-            </a:r>
-            <a:r>
-              <a:rPr lang="en-US" dirty="0" err="1"/>
-              <a:t>etc</a:t>
-            </a:r>
-            <a:r>
-              <a:rPr lang="en-US" dirty="0"/>
-              <a:t>, web app will probably use </a:t>
-            </a:r>
-            <a:r>
-              <a:rPr lang="en-US" dirty="0" err="1"/>
-              <a:t>HttpClient</a:t>
-            </a:r>
-            <a:endParaRPr lang="en-US" dirty="0"/>
-          </a:p>
-          <a:p>
-            <a:r>
-              <a:rPr lang="en-US" dirty="0"/>
-              <a:t>A bunch of types at our disposal</a:t>
+              <a:t>Primitive types have special functionality in the CLR </a:t>
             </a:r>
             <a:r>
               <a:rPr lang="en-US" dirty="0">
                 <a:sym typeface="Wingdings" panose="05000000000000000000" pitchFamily="2" charset="2"/>
               </a:rPr>
-              <a:t> things that will be stuffed into the CLR as type objects if we need them</a:t>
-            </a:r>
+              <a:t> have conversion systems built in that don’t fit in the type understanding</a:t>
+            </a:r>
+          </a:p>
+          <a:p>
+            <a:pPr lvl="1"/>
+            <a:r>
+              <a:rPr lang="en-US" dirty="0">
+                <a:sym typeface="Wingdings" panose="05000000000000000000" pitchFamily="2" charset="2"/>
+              </a:rPr>
+              <a:t>Just put under the idea of “something happens”</a:t>
+            </a:r>
+            <a:endParaRPr lang="en-US" dirty="0"/>
+          </a:p>
+          <a:p>
             <a:endParaRPr lang="en-US" dirty="0"/>
           </a:p>
         </p:txBody>
@@ -3496,7 +3841,7 @@
     </p:spTree>
     <p:extLst>
       <p:ext uri="{BB962C8B-B14F-4D97-AF65-F5344CB8AC3E}">
-        <p14:creationId xmlns:p14="http://schemas.microsoft.com/office/powerpoint/2010/main" val="4153981468"/>
+        <p14:creationId xmlns:p14="http://schemas.microsoft.com/office/powerpoint/2010/main" val="1270687675"/>
       </p:ext>
     </p:extLst>
   </p:cSld>
@@ -3528,7 +3873,7 @@
           <p:cNvPr id="2" name="Title 1">
             <a:extLst>
               <a:ext uri="{FF2B5EF4-FFF2-40B4-BE49-F238E27FC236}">
-                <a16:creationId xmlns:a16="http://schemas.microsoft.com/office/drawing/2014/main" id="{1C0FF832-1001-856D-7690-A4FFF526E371}"/>
+                <a16:creationId xmlns:a16="http://schemas.microsoft.com/office/drawing/2014/main" id="{D0827837-5D5F-90E5-CE13-455153C143AD}"/>
               </a:ext>
             </a:extLst>
           </p:cNvPr>
@@ -3546,7 +3891,7 @@
           <a:p>
             <a:r>
               <a:rPr lang="en-US" dirty="0"/>
-              <a:t>What is a primitive Type</a:t>
+              <a:t>Reference vs Value types</a:t>
             </a:r>
           </a:p>
         </p:txBody>
@@ -3556,7 +3901,7 @@
           <p:cNvPr id="3" name="Content Placeholder 2">
             <a:extLst>
               <a:ext uri="{FF2B5EF4-FFF2-40B4-BE49-F238E27FC236}">
-                <a16:creationId xmlns:a16="http://schemas.microsoft.com/office/drawing/2014/main" id="{31B9EEF5-AE8E-F21F-1CD2-25C104F0E295}"/>
+                <a16:creationId xmlns:a16="http://schemas.microsoft.com/office/drawing/2014/main" id="{83DBF81A-AAD3-9213-E854-18D6E7C92FF7}"/>
               </a:ext>
             </a:extLst>
           </p:cNvPr>
@@ -3574,18 +3919,369 @@
           <a:p>
             <a:r>
               <a:rPr lang="en-US" dirty="0"/>
-              <a:t>A basic type that comes w/ the language/CLR; types that other classes are built on</a:t>
-            </a:r>
-          </a:p>
-          <a:p>
-            <a:endParaRPr lang="en-US" dirty="0"/>
+              <a:t>Fundamentally, reference types are pointers in the managed heaps, value types are stored in the thread stack</a:t>
+            </a:r>
+          </a:p>
+          <a:p>
+            <a:r>
+              <a:rPr lang="en-US" dirty="0"/>
+              <a:t>Class-&gt; reference type</a:t>
+            </a:r>
+          </a:p>
+          <a:p>
+            <a:r>
+              <a:rPr lang="en-US" dirty="0"/>
+              <a:t>Struct -&gt; value type</a:t>
+            </a:r>
           </a:p>
         </p:txBody>
       </p:sp>
     </p:spTree>
     <p:extLst>
       <p:ext uri="{BB962C8B-B14F-4D97-AF65-F5344CB8AC3E}">
-        <p14:creationId xmlns:p14="http://schemas.microsoft.com/office/powerpoint/2010/main" val="1270687675"/>
+        <p14:creationId xmlns:p14="http://schemas.microsoft.com/office/powerpoint/2010/main" val="3952733622"/>
+      </p:ext>
+    </p:extLst>
+  </p:cSld>
+  <p:clrMapOvr>
+    <a:masterClrMapping/>
+  </p:clrMapOvr>
+</p:sld>
+</file>
+
+<file path=ppt/slides/slide7.xml><?xml version="1.0" encoding="utf-8"?>
+<p:sld xmlns:a="http://schemas.openxmlformats.org/drawingml/2006/main" xmlns:r="http://schemas.openxmlformats.org/officeDocument/2006/relationships" xmlns:p="http://schemas.openxmlformats.org/presentationml/2006/main">
+  <p:cSld>
+    <p:spTree>
+      <p:nvGrpSpPr>
+        <p:cNvPr id="1" name=""/>
+        <p:cNvGrpSpPr/>
+        <p:nvPr/>
+      </p:nvGrpSpPr>
+      <p:grpSpPr>
+        <a:xfrm>
+          <a:off x="0" y="0"/>
+          <a:ext cx="0" cy="0"/>
+          <a:chOff x="0" y="0"/>
+          <a:chExt cx="0" cy="0"/>
+        </a:xfrm>
+      </p:grpSpPr>
+      <p:sp>
+        <p:nvSpPr>
+          <p:cNvPr id="17" name="Title 16">
+            <a:extLst>
+              <a:ext uri="{FF2B5EF4-FFF2-40B4-BE49-F238E27FC236}">
+                <a16:creationId xmlns:a16="http://schemas.microsoft.com/office/drawing/2014/main" id="{6DE1942C-2F6E-77A9-6BDF-203EED970CE6}"/>
+              </a:ext>
+            </a:extLst>
+          </p:cNvPr>
+          <p:cNvSpPr>
+            <a:spLocks noGrp="1"/>
+          </p:cNvSpPr>
+          <p:nvPr>
+            <p:ph type="title"/>
+          </p:nvPr>
+        </p:nvSpPr>
+        <p:spPr/>
+        <p:txBody>
+          <a:bodyPr/>
+          <a:lstStyle/>
+          <a:p>
+            <a:r>
+              <a:rPr lang="en-US" dirty="0"/>
+              <a:t>Start of Method</a:t>
+            </a:r>
+          </a:p>
+        </p:txBody>
+      </p:sp>
+      <p:pic>
+        <p:nvPicPr>
+          <p:cNvPr id="20" name="Content Placeholder 19">
+            <a:extLst>
+              <a:ext uri="{FF2B5EF4-FFF2-40B4-BE49-F238E27FC236}">
+                <a16:creationId xmlns:a16="http://schemas.microsoft.com/office/drawing/2014/main" id="{4584CAE2-C26D-63B1-3D7F-629572B7AD52}"/>
+              </a:ext>
+            </a:extLst>
+          </p:cNvPr>
+          <p:cNvPicPr>
+            <a:picLocks noGrp="1" noChangeAspect="1"/>
+          </p:cNvPicPr>
+          <p:nvPr>
+            <p:ph idx="1"/>
+          </p:nvPr>
+        </p:nvPicPr>
+        <p:blipFill>
+          <a:blip r:embed="rId2"/>
+          <a:stretch>
+            <a:fillRect/>
+          </a:stretch>
+        </p:blipFill>
+        <p:spPr>
+          <a:xfrm>
+            <a:off x="3420130" y="1825625"/>
+            <a:ext cx="5351739" cy="4351338"/>
+          </a:xfrm>
+        </p:spPr>
+      </p:pic>
+      <p:sp>
+        <p:nvSpPr>
+          <p:cNvPr id="22" name="TextBox 21">
+            <a:extLst>
+              <a:ext uri="{FF2B5EF4-FFF2-40B4-BE49-F238E27FC236}">
+                <a16:creationId xmlns:a16="http://schemas.microsoft.com/office/drawing/2014/main" id="{114B8C8D-118B-BAFC-32C2-0670A69690E8}"/>
+              </a:ext>
+            </a:extLst>
+          </p:cNvPr>
+          <p:cNvSpPr txBox="1"/>
+          <p:nvPr/>
+        </p:nvSpPr>
+        <p:spPr>
+          <a:xfrm>
+            <a:off x="6211835" y="1179294"/>
+            <a:ext cx="6094428" cy="646331"/>
+          </a:xfrm>
+          <a:prstGeom prst="rect">
+            <a:avLst/>
+          </a:prstGeom>
+          <a:noFill/>
+        </p:spPr>
+        <p:txBody>
+          <a:bodyPr wrap="square">
+            <a:spAutoFit/>
+          </a:bodyPr>
+          <a:lstStyle/>
+          <a:p>
+            <a:r>
+              <a:rPr lang="en-US" dirty="0" err="1"/>
+              <a:t>SomeReference</a:t>
+            </a:r>
+            <a:r>
+              <a:rPr lang="en-US" dirty="0"/>
+              <a:t> r1 = new </a:t>
+            </a:r>
+            <a:r>
+              <a:rPr lang="en-US" dirty="0" err="1"/>
+              <a:t>SomeReference</a:t>
+            </a:r>
+            <a:r>
+              <a:rPr lang="en-US" dirty="0"/>
+              <a:t>();</a:t>
+            </a:r>
+            <a:br>
+              <a:rPr lang="en-US" dirty="0"/>
+            </a:br>
+            <a:r>
+              <a:rPr lang="en-US" dirty="0" err="1"/>
+              <a:t>SomeReference</a:t>
+            </a:r>
+            <a:r>
+              <a:rPr lang="en-US" dirty="0"/>
+              <a:t> v1 = new </a:t>
+            </a:r>
+            <a:r>
+              <a:rPr lang="en-US" dirty="0" err="1"/>
+              <a:t>SOmeValue</a:t>
+            </a:r>
+            <a:r>
+              <a:rPr lang="en-US" dirty="0"/>
+              <a:t>();</a:t>
+            </a:r>
+          </a:p>
+        </p:txBody>
+      </p:sp>
+    </p:spTree>
+    <p:extLst>
+      <p:ext uri="{BB962C8B-B14F-4D97-AF65-F5344CB8AC3E}">
+        <p14:creationId xmlns:p14="http://schemas.microsoft.com/office/powerpoint/2010/main" val="1644240487"/>
+      </p:ext>
+    </p:extLst>
+  </p:cSld>
+  <p:clrMapOvr>
+    <a:masterClrMapping/>
+  </p:clrMapOvr>
+</p:sld>
+</file>
+
+<file path=ppt/slides/slide8.xml><?xml version="1.0" encoding="utf-8"?>
+<p:sld xmlns:a="http://schemas.openxmlformats.org/drawingml/2006/main" xmlns:r="http://schemas.openxmlformats.org/officeDocument/2006/relationships" xmlns:p="http://schemas.openxmlformats.org/presentationml/2006/main">
+  <p:cSld>
+    <p:spTree>
+      <p:nvGrpSpPr>
+        <p:cNvPr id="1" name=""/>
+        <p:cNvGrpSpPr/>
+        <p:nvPr/>
+      </p:nvGrpSpPr>
+      <p:grpSpPr>
+        <a:xfrm>
+          <a:off x="0" y="0"/>
+          <a:ext cx="0" cy="0"/>
+          <a:chOff x="0" y="0"/>
+          <a:chExt cx="0" cy="0"/>
+        </a:xfrm>
+      </p:grpSpPr>
+      <p:sp>
+        <p:nvSpPr>
+          <p:cNvPr id="17" name="Title 16">
+            <a:extLst>
+              <a:ext uri="{FF2B5EF4-FFF2-40B4-BE49-F238E27FC236}">
+                <a16:creationId xmlns:a16="http://schemas.microsoft.com/office/drawing/2014/main" id="{6DE1942C-2F6E-77A9-6BDF-203EED970CE6}"/>
+              </a:ext>
+            </a:extLst>
+          </p:cNvPr>
+          <p:cNvSpPr>
+            <a:spLocks noGrp="1"/>
+          </p:cNvSpPr>
+          <p:nvPr>
+            <p:ph type="title"/>
+          </p:nvPr>
+        </p:nvSpPr>
+        <p:spPr/>
+        <p:txBody>
+          <a:bodyPr/>
+          <a:lstStyle/>
+          <a:p>
+            <a:r>
+              <a:rPr lang="en-US" dirty="0"/>
+              <a:t>R1.x = 5; v1.x = 5</a:t>
+            </a:r>
+          </a:p>
+        </p:txBody>
+      </p:sp>
+      <p:pic>
+        <p:nvPicPr>
+          <p:cNvPr id="18" name="Content Placeholder 17">
+            <a:extLst>
+              <a:ext uri="{FF2B5EF4-FFF2-40B4-BE49-F238E27FC236}">
+                <a16:creationId xmlns:a16="http://schemas.microsoft.com/office/drawing/2014/main" id="{0C312CAA-3674-5BCA-58DD-CEAF852E734D}"/>
+              </a:ext>
+            </a:extLst>
+          </p:cNvPr>
+          <p:cNvPicPr>
+            <a:picLocks noGrp="1" noChangeAspect="1"/>
+          </p:cNvPicPr>
+          <p:nvPr>
+            <p:ph idx="1"/>
+          </p:nvPr>
+        </p:nvPicPr>
+        <p:blipFill>
+          <a:blip r:embed="rId2"/>
+          <a:stretch>
+            <a:fillRect/>
+          </a:stretch>
+        </p:blipFill>
+        <p:spPr>
+          <a:xfrm>
+            <a:off x="3048000" y="2624931"/>
+            <a:ext cx="6096000" cy="2752725"/>
+          </a:xfrm>
+        </p:spPr>
+      </p:pic>
+    </p:spTree>
+    <p:extLst>
+      <p:ext uri="{BB962C8B-B14F-4D97-AF65-F5344CB8AC3E}">
+        <p14:creationId xmlns:p14="http://schemas.microsoft.com/office/powerpoint/2010/main" val="2745532450"/>
+      </p:ext>
+    </p:extLst>
+  </p:cSld>
+  <p:clrMapOvr>
+    <a:masterClrMapping/>
+  </p:clrMapOvr>
+</p:sld>
+</file>
+
+<file path=ppt/slides/slide9.xml><?xml version="1.0" encoding="utf-8"?>
+<p:sld xmlns:a="http://schemas.openxmlformats.org/drawingml/2006/main" xmlns:r="http://schemas.openxmlformats.org/officeDocument/2006/relationships" xmlns:p="http://schemas.openxmlformats.org/presentationml/2006/main">
+  <p:cSld>
+    <p:spTree>
+      <p:nvGrpSpPr>
+        <p:cNvPr id="1" name=""/>
+        <p:cNvGrpSpPr/>
+        <p:nvPr/>
+      </p:nvGrpSpPr>
+      <p:grpSpPr>
+        <a:xfrm>
+          <a:off x="0" y="0"/>
+          <a:ext cx="0" cy="0"/>
+          <a:chOff x="0" y="0"/>
+          <a:chExt cx="0" cy="0"/>
+        </a:xfrm>
+      </p:grpSpPr>
+      <p:pic>
+        <p:nvPicPr>
+          <p:cNvPr id="7" name="Content Placeholder 6">
+            <a:extLst>
+              <a:ext uri="{FF2B5EF4-FFF2-40B4-BE49-F238E27FC236}">
+                <a16:creationId xmlns:a16="http://schemas.microsoft.com/office/drawing/2014/main" id="{FD84EC25-BCC7-104E-E1FC-4F1DA9E7CE9E}"/>
+              </a:ext>
+            </a:extLst>
+          </p:cNvPr>
+          <p:cNvPicPr>
+            <a:picLocks noGrp="1" noChangeAspect="1"/>
+          </p:cNvPicPr>
+          <p:nvPr>
+            <p:ph idx="1"/>
+          </p:nvPr>
+        </p:nvPicPr>
+        <p:blipFill>
+          <a:blip r:embed="rId2"/>
+          <a:stretch>
+            <a:fillRect/>
+          </a:stretch>
+        </p:blipFill>
+        <p:spPr>
+          <a:xfrm>
+            <a:off x="3048000" y="2624931"/>
+            <a:ext cx="6096000" cy="2752725"/>
+          </a:xfrm>
+        </p:spPr>
+      </p:pic>
+      <p:sp>
+        <p:nvSpPr>
+          <p:cNvPr id="10" name="Title 9">
+            <a:extLst>
+              <a:ext uri="{FF2B5EF4-FFF2-40B4-BE49-F238E27FC236}">
+                <a16:creationId xmlns:a16="http://schemas.microsoft.com/office/drawing/2014/main" id="{548346C7-9F7B-7FEA-E9AD-269D66D247D5}"/>
+              </a:ext>
+            </a:extLst>
+          </p:cNvPr>
+          <p:cNvSpPr>
+            <a:spLocks noGrp="1"/>
+          </p:cNvSpPr>
+          <p:nvPr>
+            <p:ph type="title"/>
+          </p:nvPr>
+        </p:nvSpPr>
+        <p:spPr/>
+        <p:txBody>
+          <a:bodyPr/>
+          <a:lstStyle/>
+          <a:p>
+            <a:r>
+              <a:rPr lang="en-US" dirty="0" err="1"/>
+              <a:t>SomeReference</a:t>
+            </a:r>
+            <a:r>
+              <a:rPr lang="en-US" dirty="0"/>
+              <a:t> r2 = r1</a:t>
+            </a:r>
+            <a:br>
+              <a:rPr lang="en-US" dirty="0"/>
+            </a:br>
+            <a:r>
+              <a:rPr lang="en-US" dirty="0" err="1"/>
+              <a:t>SomeVal</a:t>
+            </a:r>
+            <a:r>
+              <a:rPr lang="en-US" dirty="0"/>
+              <a:t> v2 = v1</a:t>
+            </a:r>
+          </a:p>
+        </p:txBody>
+      </p:sp>
+    </p:spTree>
+    <p:extLst>
+      <p:ext uri="{BB962C8B-B14F-4D97-AF65-F5344CB8AC3E}">
+        <p14:creationId xmlns:p14="http://schemas.microsoft.com/office/powerpoint/2010/main" val="1496324024"/>
       </p:ext>
     </p:extLst>
   </p:cSld>

</xml_diff>